<commit_message>
PPT and table update
</commit_message>
<xml_diff>
--- a/doc/Babylon studio presentation.pptx
+++ b/doc/Babylon studio presentation.pptx
@@ -1,6 +1,6 @@
 
 <file path=ppt/presentation.xml><?xml version="1.0" encoding="utf-8"?>
-<p:presentation xmlns:a="http://schemas.openxmlformats.org/drawingml/2006/main" xmlns:r="http://schemas.openxmlformats.org/officeDocument/2006/relationships" xmlns:p="http://schemas.openxmlformats.org/presentationml/2006/main" saveSubsetFonts="1">
+<p:presentation xmlns:a="http://schemas.openxmlformats.org/drawingml/2006/main" xmlns:r="http://schemas.openxmlformats.org/officeDocument/2006/relationships" xmlns:p="http://schemas.openxmlformats.org/presentationml/2006/main" serverZoom="28641" saveSubsetFonts="1">
   <p:sldMasterIdLst>
     <p:sldMasterId id="2147484335" r:id="rId1"/>
   </p:sldMasterIdLst>
@@ -8327,7 +8327,7 @@
         </p:nvSpPr>
         <p:spPr>
           <a:xfrm>
-            <a:off x="680319" y="296028"/>
+            <a:off x="634883" y="121733"/>
             <a:ext cx="9613861" cy="1080938"/>
           </a:xfrm>
         </p:spPr>
@@ -8373,37 +8373,31 @@
       </p:sp>
       <p:pic>
         <p:nvPicPr>
-          <p:cNvPr id="4" name="Imagen 3">
+          <p:cNvPr id="6" name="Imagen 5">
             <a:extLst>
               <a:ext uri="{FF2B5EF4-FFF2-40B4-BE49-F238E27FC236}">
-                <a16:creationId xmlns:a16="http://schemas.microsoft.com/office/drawing/2014/main" id="{473987E1-5825-E941-8104-A200BDCCFB92}"/>
+                <a16:creationId xmlns:a16="http://schemas.microsoft.com/office/drawing/2014/main" id="{2483FEAC-D85B-4642-AF45-E8C3B960F181}"/>
               </a:ext>
             </a:extLst>
           </p:cNvPr>
-          <p:cNvPicPr/>
+          <p:cNvPicPr>
+            <a:picLocks noChangeAspect="1"/>
+          </p:cNvPicPr>
           <p:nvPr/>
         </p:nvPicPr>
         <p:blipFill rotWithShape="1">
           <a:blip r:embed="rId2"/>
-          <a:srcRect l="10777" t="16280" r="1581" b="5311"/>
+          <a:srcRect l="11319" t="15736" r="1150" b="12712"/>
           <a:stretch/>
         </p:blipFill>
-        <p:spPr bwMode="auto">
-          <a:xfrm>
-            <a:off x="578720" y="1148366"/>
-            <a:ext cx="10635380" cy="5519134"/>
+        <p:spPr>
+          <a:xfrm>
+            <a:off x="210459" y="1149406"/>
+            <a:ext cx="11771082" cy="5412566"/>
           </a:xfrm>
           <a:prstGeom prst="rect">
             <a:avLst/>
           </a:prstGeom>
-          <a:ln>
-            <a:noFill/>
-          </a:ln>
-          <a:extLst>
-            <a:ext uri="{53640926-AAD7-44D8-BBD7-CCE9431645EC}">
-              <a14:shadowObscured xmlns:a14="http://schemas.microsoft.com/office/drawing/2010/main"/>
-            </a:ext>
-          </a:extLst>
         </p:spPr>
       </p:pic>
     </p:spTree>

</xml_diff>

<commit_message>
PPT and Word. ER Diagram update
</commit_message>
<xml_diff>
--- a/doc/Babylon studio presentation.pptx
+++ b/doc/Babylon studio presentation.pptx
@@ -390,7 +390,7 @@
           <a:p>
             <a:fld id="{1C98F3CC-CA5B-BA4B-BAD5-C648455EC89A}" type="datetimeFigureOut">
               <a:rPr lang="es-ES" smtClean="0"/>
-              <a:t>13/02/2018</a:t>
+              <a:t>15/02/2018</a:t>
             </a:fld>
             <a:endParaRPr lang="es-ES"/>
           </a:p>
@@ -804,7 +804,7 @@
           <a:p>
             <a:fld id="{1C98F3CC-CA5B-BA4B-BAD5-C648455EC89A}" type="datetimeFigureOut">
               <a:rPr lang="es-ES" smtClean="0"/>
-              <a:t>13/02/2018</a:t>
+              <a:t>15/02/2018</a:t>
             </a:fld>
             <a:endParaRPr lang="es-ES"/>
           </a:p>
@@ -1140,7 +1140,7 @@
           <a:p>
             <a:fld id="{1C98F3CC-CA5B-BA4B-BAD5-C648455EC89A}" type="datetimeFigureOut">
               <a:rPr lang="es-ES" smtClean="0"/>
-              <a:t>13/02/2018</a:t>
+              <a:t>15/02/2018</a:t>
             </a:fld>
             <a:endParaRPr lang="es-ES"/>
           </a:p>
@@ -1545,7 +1545,7 @@
           <a:p>
             <a:fld id="{1C98F3CC-CA5B-BA4B-BAD5-C648455EC89A}" type="datetimeFigureOut">
               <a:rPr lang="es-ES" smtClean="0"/>
-              <a:t>13/02/2018</a:t>
+              <a:t>15/02/2018</a:t>
             </a:fld>
             <a:endParaRPr lang="es-ES"/>
           </a:p>
@@ -2113,7 +2113,7 @@
           <a:p>
             <a:fld id="{1C98F3CC-CA5B-BA4B-BAD5-C648455EC89A}" type="datetimeFigureOut">
               <a:rPr lang="es-ES" smtClean="0"/>
-              <a:t>13/02/2018</a:t>
+              <a:t>15/02/2018</a:t>
             </a:fld>
             <a:endParaRPr lang="es-ES"/>
           </a:p>
@@ -2794,7 +2794,7 @@
           <a:p>
             <a:fld id="{1C98F3CC-CA5B-BA4B-BAD5-C648455EC89A}" type="datetimeFigureOut">
               <a:rPr lang="es-ES" smtClean="0"/>
-              <a:t>13/02/2018</a:t>
+              <a:t>15/02/2018</a:t>
             </a:fld>
             <a:endParaRPr lang="es-ES"/>
           </a:p>
@@ -3707,7 +3707,7 @@
           <a:p>
             <a:fld id="{1C98F3CC-CA5B-BA4B-BAD5-C648455EC89A}" type="datetimeFigureOut">
               <a:rPr lang="es-ES" smtClean="0"/>
-              <a:t>13/02/2018</a:t>
+              <a:t>15/02/2018</a:t>
             </a:fld>
             <a:endParaRPr lang="es-ES"/>
           </a:p>
@@ -4020,7 +4020,7 @@
           <a:p>
             <a:fld id="{1C98F3CC-CA5B-BA4B-BAD5-C648455EC89A}" type="datetimeFigureOut">
               <a:rPr lang="es-ES" smtClean="0"/>
-              <a:t>13/02/2018</a:t>
+              <a:t>15/02/2018</a:t>
             </a:fld>
             <a:endParaRPr lang="es-ES"/>
           </a:p>
@@ -4284,7 +4284,7 @@
           <a:p>
             <a:fld id="{1C98F3CC-CA5B-BA4B-BAD5-C648455EC89A}" type="datetimeFigureOut">
               <a:rPr lang="es-ES" smtClean="0"/>
-              <a:t>13/02/2018</a:t>
+              <a:t>15/02/2018</a:t>
             </a:fld>
             <a:endParaRPr lang="es-ES"/>
           </a:p>
@@ -4607,7 +4607,7 @@
           <a:p>
             <a:fld id="{1C98F3CC-CA5B-BA4B-BAD5-C648455EC89A}" type="datetimeFigureOut">
               <a:rPr lang="es-ES" smtClean="0"/>
-              <a:t>13/02/2018</a:t>
+              <a:t>15/02/2018</a:t>
             </a:fld>
             <a:endParaRPr lang="es-ES"/>
           </a:p>
@@ -4996,7 +4996,7 @@
           <a:p>
             <a:fld id="{1C98F3CC-CA5B-BA4B-BAD5-C648455EC89A}" type="datetimeFigureOut">
               <a:rPr lang="es-ES" smtClean="0"/>
-              <a:t>13/02/2018</a:t>
+              <a:t>15/02/2018</a:t>
             </a:fld>
             <a:endParaRPr lang="es-ES"/>
           </a:p>
@@ -5372,7 +5372,7 @@
           <a:p>
             <a:fld id="{1C98F3CC-CA5B-BA4B-BAD5-C648455EC89A}" type="datetimeFigureOut">
               <a:rPr lang="es-ES" smtClean="0"/>
-              <a:t>13/02/2018</a:t>
+              <a:t>15/02/2018</a:t>
             </a:fld>
             <a:endParaRPr lang="es-ES"/>
           </a:p>
@@ -5878,7 +5878,7 @@
           <a:p>
             <a:fld id="{1C98F3CC-CA5B-BA4B-BAD5-C648455EC89A}" type="datetimeFigureOut">
               <a:rPr lang="es-ES" smtClean="0"/>
-              <a:t>13/02/2018</a:t>
+              <a:t>15/02/2018</a:t>
             </a:fld>
             <a:endParaRPr lang="es-ES"/>
           </a:p>
@@ -6135,7 +6135,7 @@
           <a:p>
             <a:fld id="{1C98F3CC-CA5B-BA4B-BAD5-C648455EC89A}" type="datetimeFigureOut">
               <a:rPr lang="es-ES" smtClean="0"/>
-              <a:t>13/02/2018</a:t>
+              <a:t>15/02/2018</a:t>
             </a:fld>
             <a:endParaRPr lang="es-ES"/>
           </a:p>
@@ -6298,7 +6298,7 @@
           <a:p>
             <a:fld id="{1C98F3CC-CA5B-BA4B-BAD5-C648455EC89A}" type="datetimeFigureOut">
               <a:rPr lang="es-ES" smtClean="0"/>
-              <a:t>13/02/2018</a:t>
+              <a:t>15/02/2018</a:t>
             </a:fld>
             <a:endParaRPr lang="es-ES"/>
           </a:p>
@@ -6688,7 +6688,7 @@
           <a:p>
             <a:fld id="{1C98F3CC-CA5B-BA4B-BAD5-C648455EC89A}" type="datetimeFigureOut">
               <a:rPr lang="es-ES" smtClean="0"/>
-              <a:t>13/02/2018</a:t>
+              <a:t>15/02/2018</a:t>
             </a:fld>
             <a:endParaRPr lang="es-ES"/>
           </a:p>
@@ -7097,7 +7097,7 @@
           <a:p>
             <a:fld id="{1C98F3CC-CA5B-BA4B-BAD5-C648455EC89A}" type="datetimeFigureOut">
               <a:rPr lang="es-ES" smtClean="0"/>
-              <a:t>13/02/2018</a:t>
+              <a:t>15/02/2018</a:t>
             </a:fld>
             <a:endParaRPr lang="es-ES"/>
           </a:p>
@@ -7341,7 +7341,7 @@
           <a:p>
             <a:fld id="{1C98F3CC-CA5B-BA4B-BAD5-C648455EC89A}" type="datetimeFigureOut">
               <a:rPr lang="es-ES" smtClean="0"/>
-              <a:t>13/02/2018</a:t>
+              <a:t>15/02/2018</a:t>
             </a:fld>
             <a:endParaRPr lang="es-ES"/>
           </a:p>
@@ -8002,7 +8002,7 @@
             </a:r>
             <a:r>
               <a:rPr lang="en-US" dirty="0"/>
-              <a:t>histories</a:t>
+              <a:t>histories </a:t>
             </a:r>
           </a:p>
           <a:p>
@@ -8024,6 +8024,21 @@
             <a:r>
               <a:rPr lang="en-US" dirty="0"/>
               <a:t>Enables the doctors to check their pending appointments</a:t>
+            </a:r>
+          </a:p>
+          <a:p>
+            <a:pPr algn="just"/>
+            <a:r>
+              <a:rPr lang="en-US" dirty="0"/>
+              <a:t>Enables the doctors to update the </a:t>
+            </a:r>
+            <a:r>
+              <a:rPr lang="en-US" dirty="0" err="1"/>
+              <a:t>patients´clinical</a:t>
+            </a:r>
+            <a:r>
+              <a:rPr lang="en-US" dirty="0"/>
+              <a:t> histories</a:t>
             </a:r>
           </a:p>
           <a:p>
@@ -8373,10 +8388,10 @@
       </p:sp>
       <p:pic>
         <p:nvPicPr>
-          <p:cNvPr id="6" name="Imagen 5">
+          <p:cNvPr id="4" name="Imagen 3">
             <a:extLst>
               <a:ext uri="{FF2B5EF4-FFF2-40B4-BE49-F238E27FC236}">
-                <a16:creationId xmlns:a16="http://schemas.microsoft.com/office/drawing/2014/main" id="{2483FEAC-D85B-4642-AF45-E8C3B960F181}"/>
+                <a16:creationId xmlns:a16="http://schemas.microsoft.com/office/drawing/2014/main" id="{FC3A2C80-AFB0-402C-8E48-DA9FEED52055}"/>
               </a:ext>
             </a:extLst>
           </p:cNvPr>
@@ -8387,13 +8402,13 @@
         </p:nvPicPr>
         <p:blipFill rotWithShape="1">
           <a:blip r:embed="rId2"/>
-          <a:srcRect l="11319" t="15736" r="1150" b="12712"/>
+          <a:srcRect l="11040" t="15652" r="1755" b="12050"/>
           <a:stretch/>
         </p:blipFill>
         <p:spPr>
           <a:xfrm>
-            <a:off x="210459" y="1149406"/>
-            <a:ext cx="11771082" cy="5412566"/>
+            <a:off x="348343" y="1034325"/>
+            <a:ext cx="11495314" cy="5360795"/>
           </a:xfrm>
           <a:prstGeom prst="rect">
             <a:avLst/>

</xml_diff>